<commit_message>
New rules and updated graphics
</commit_message>
<xml_diff>
--- a/assets/Graphics.pptx
+++ b/assets/Graphics.pptx
@@ -260,7 +260,7 @@
           <a:p>
             <a:fld id="{C1CF96F9-34A2-4066-8EED-07CB4ABE7039}" type="datetimeFigureOut">
               <a:rPr lang="en-US" smtClean="0"/>
-              <a:t>8/23/2023</a:t>
+              <a:t>4/15/2024</a:t>
             </a:fld>
             <a:endParaRPr lang="en-US"/>
           </a:p>
@@ -458,7 +458,7 @@
           <a:p>
             <a:fld id="{C1CF96F9-34A2-4066-8EED-07CB4ABE7039}" type="datetimeFigureOut">
               <a:rPr lang="en-US" smtClean="0"/>
-              <a:t>8/23/2023</a:t>
+              <a:t>4/15/2024</a:t>
             </a:fld>
             <a:endParaRPr lang="en-US"/>
           </a:p>
@@ -666,7 +666,7 @@
           <a:p>
             <a:fld id="{C1CF96F9-34A2-4066-8EED-07CB4ABE7039}" type="datetimeFigureOut">
               <a:rPr lang="en-US" smtClean="0"/>
-              <a:t>8/23/2023</a:t>
+              <a:t>4/15/2024</a:t>
             </a:fld>
             <a:endParaRPr lang="en-US"/>
           </a:p>
@@ -864,7 +864,7 @@
           <a:p>
             <a:fld id="{C1CF96F9-34A2-4066-8EED-07CB4ABE7039}" type="datetimeFigureOut">
               <a:rPr lang="en-US" smtClean="0"/>
-              <a:t>8/23/2023</a:t>
+              <a:t>4/15/2024</a:t>
             </a:fld>
             <a:endParaRPr lang="en-US"/>
           </a:p>
@@ -1139,7 +1139,7 @@
           <a:p>
             <a:fld id="{C1CF96F9-34A2-4066-8EED-07CB4ABE7039}" type="datetimeFigureOut">
               <a:rPr lang="en-US" smtClean="0"/>
-              <a:t>8/23/2023</a:t>
+              <a:t>4/15/2024</a:t>
             </a:fld>
             <a:endParaRPr lang="en-US"/>
           </a:p>
@@ -1404,7 +1404,7 @@
           <a:p>
             <a:fld id="{C1CF96F9-34A2-4066-8EED-07CB4ABE7039}" type="datetimeFigureOut">
               <a:rPr lang="en-US" smtClean="0"/>
-              <a:t>8/23/2023</a:t>
+              <a:t>4/15/2024</a:t>
             </a:fld>
             <a:endParaRPr lang="en-US"/>
           </a:p>
@@ -1816,7 +1816,7 @@
           <a:p>
             <a:fld id="{C1CF96F9-34A2-4066-8EED-07CB4ABE7039}" type="datetimeFigureOut">
               <a:rPr lang="en-US" smtClean="0"/>
-              <a:t>8/23/2023</a:t>
+              <a:t>4/15/2024</a:t>
             </a:fld>
             <a:endParaRPr lang="en-US"/>
           </a:p>
@@ -1957,7 +1957,7 @@
           <a:p>
             <a:fld id="{C1CF96F9-34A2-4066-8EED-07CB4ABE7039}" type="datetimeFigureOut">
               <a:rPr lang="en-US" smtClean="0"/>
-              <a:t>8/23/2023</a:t>
+              <a:t>4/15/2024</a:t>
             </a:fld>
             <a:endParaRPr lang="en-US"/>
           </a:p>
@@ -2070,7 +2070,7 @@
           <a:p>
             <a:fld id="{C1CF96F9-34A2-4066-8EED-07CB4ABE7039}" type="datetimeFigureOut">
               <a:rPr lang="en-US" smtClean="0"/>
-              <a:t>8/23/2023</a:t>
+              <a:t>4/15/2024</a:t>
             </a:fld>
             <a:endParaRPr lang="en-US"/>
           </a:p>
@@ -2381,7 +2381,7 @@
           <a:p>
             <a:fld id="{C1CF96F9-34A2-4066-8EED-07CB4ABE7039}" type="datetimeFigureOut">
               <a:rPr lang="en-US" smtClean="0"/>
-              <a:t>8/23/2023</a:t>
+              <a:t>4/15/2024</a:t>
             </a:fld>
             <a:endParaRPr lang="en-US"/>
           </a:p>
@@ -2669,7 +2669,7 @@
           <a:p>
             <a:fld id="{C1CF96F9-34A2-4066-8EED-07CB4ABE7039}" type="datetimeFigureOut">
               <a:rPr lang="en-US" smtClean="0"/>
-              <a:t>8/23/2023</a:t>
+              <a:t>4/15/2024</a:t>
             </a:fld>
             <a:endParaRPr lang="en-US"/>
           </a:p>
@@ -2910,7 +2910,7 @@
           <a:p>
             <a:fld id="{C1CF96F9-34A2-4066-8EED-07CB4ABE7039}" type="datetimeFigureOut">
               <a:rPr lang="en-US" smtClean="0"/>
-              <a:t>8/23/2023</a:t>
+              <a:t>4/15/2024</a:t>
             </a:fld>
             <a:endParaRPr lang="en-US"/>
           </a:p>
@@ -3427,10 +3427,10 @@
         </p:nvGrpSpPr>
         <p:grpSpPr>
           <a:xfrm>
-            <a:off x="1252728" y="1463574"/>
-            <a:ext cx="7181992" cy="4476945"/>
-            <a:chOff x="1412818" y="668046"/>
-            <a:chExt cx="6406536" cy="3993561"/>
+            <a:off x="1264711" y="1513662"/>
+            <a:ext cx="7686494" cy="4328046"/>
+            <a:chOff x="1423512" y="712726"/>
+            <a:chExt cx="6856556" cy="3860738"/>
           </a:xfrm>
         </p:grpSpPr>
         <p:sp>
@@ -3447,8 +3447,8 @@
           </p:nvSpPr>
           <p:spPr>
             <a:xfrm>
-              <a:off x="1412818" y="668046"/>
-              <a:ext cx="3993278" cy="3993561"/>
+              <a:off x="1423512" y="712726"/>
+              <a:ext cx="3854614" cy="3854887"/>
             </a:xfrm>
             <a:custGeom>
               <a:avLst/>
@@ -3585,8 +3585,8 @@
           </p:nvSpPr>
           <p:spPr>
             <a:xfrm>
-              <a:off x="4545763" y="915650"/>
-              <a:ext cx="3273591" cy="3273820"/>
+              <a:off x="4425454" y="718581"/>
+              <a:ext cx="3854614" cy="3854883"/>
             </a:xfrm>
             <a:custGeom>
               <a:avLst/>
@@ -3727,7 +3727,7 @@
         </p:nvSpPr>
         <p:spPr>
           <a:xfrm>
-            <a:off x="2626268" y="1591032"/>
+            <a:off x="2662608" y="1557308"/>
             <a:ext cx="1771639" cy="4247317"/>
           </a:xfrm>
           <a:prstGeom prst="rect">
@@ -3905,8 +3905,8 @@
         </p:nvSpPr>
         <p:spPr>
           <a:xfrm>
-            <a:off x="6096000" y="1741148"/>
-            <a:ext cx="1450718" cy="3693319"/>
+            <a:off x="6162054" y="1559519"/>
+            <a:ext cx="1450718" cy="4247317"/>
           </a:xfrm>
           <a:prstGeom prst="rect">
             <a:avLst/>
@@ -3957,7 +3957,19 @@
           <a:p>
             <a:r>
               <a:rPr lang="en-US" dirty="0"/>
+              <a:t>"graph"</a:t>
+            </a:r>
+          </a:p>
+          <a:p>
+            <a:r>
+              <a:rPr lang="en-US" dirty="0"/>
               <a:t>"iteration"</a:t>
+            </a:r>
+          </a:p>
+          <a:p>
+            <a:r>
+              <a:rPr lang="en-US" dirty="0"/>
+              <a:t>"machine"</a:t>
             </a:r>
           </a:p>
           <a:p>
@@ -4014,8 +4026,8 @@
         </p:nvSpPr>
         <p:spPr>
           <a:xfrm>
-            <a:off x="4859157" y="2596166"/>
-            <a:ext cx="884858" cy="2308324"/>
+            <a:off x="4710930" y="2617709"/>
+            <a:ext cx="894797" cy="2308324"/>
           </a:xfrm>
           <a:prstGeom prst="rect">
             <a:avLst/>
@@ -4067,7 +4079,7 @@
             </a:br>
             <a:r>
               <a:rPr lang="en-US" dirty="0"/>
-              <a:t>"what"</a:t>
+              <a:t>"when"</a:t>
             </a:r>
           </a:p>
           <a:p>
@@ -4089,7 +4101,7 @@
         </p:nvSpPr>
         <p:spPr>
           <a:xfrm>
-            <a:off x="2458147" y="1084275"/>
+            <a:off x="2456414" y="1152845"/>
             <a:ext cx="1937775" cy="400110"/>
           </a:xfrm>
           <a:prstGeom prst="rect">
@@ -4125,7 +4137,7 @@
         </p:nvSpPr>
         <p:spPr>
           <a:xfrm>
-            <a:off x="5012261" y="1341038"/>
+            <a:off x="5076269" y="1152845"/>
             <a:ext cx="3449406" cy="400110"/>
           </a:xfrm>
           <a:prstGeom prst="rect">
@@ -4161,7 +4173,7 @@
         </p:nvSpPr>
         <p:spPr>
           <a:xfrm>
-            <a:off x="5170708" y="5188159"/>
+            <a:off x="4942108" y="5243023"/>
             <a:ext cx="692818" cy="400110"/>
           </a:xfrm>
           <a:prstGeom prst="rect">
@@ -4196,7 +4208,7 @@
         </p:nvSpPr>
         <p:spPr>
           <a:xfrm rot="15193331">
-            <a:off x="5179132" y="4754207"/>
+            <a:off x="4950532" y="4809071"/>
             <a:ext cx="492427" cy="408896"/>
           </a:xfrm>
           <a:prstGeom prst="rightArrow">

</xml_diff>